<commit_message>
Redesign scanners page with dark/sleek modern dashboard aesthetic
- New dark theme with subtle grid background
- Added JSON import for commanders (skip scanning)
- Gradient cards with status badges
- Professional typography and spacing
- Tips section with numbered steps
- Preloaded commanders support in CommanderScanner

🤖 Generated with [Claude Code](https://claude.com/claude-code)

Co-Authored-By: Claude Opus 4.5 <noreply@anthropic.com>
</commit_message>
<xml_diff>
--- a/apps/web/public/aoo-map.pptx
+++ b/apps/web/public/aoo-map.pptx
@@ -4,8 +4,13 @@
   <p:sldMasterIdLst>
     <p:sldMasterId id="2147483660" r:id="rId1"/>
   </p:sldMasterIdLst>
+  <p:notesMasterIdLst>
+    <p:notesMasterId r:id="rId5"/>
+  </p:notesMasterIdLst>
   <p:sldIdLst>
     <p:sldId id="256" r:id="rId2"/>
+    <p:sldId id="258" r:id="rId3"/>
+    <p:sldId id="257" r:id="rId4"/>
   </p:sldIdLst>
   <p:sldSz cx="8961438" cy="6858000"/>
   <p:notesSz cx="6858000" cy="9144000"/>
@@ -110,6 +115,439 @@
     </p:ext>
   </p:extLst>
 </p:presentation>
+</file>
+
+<file path=ppt/notesMasters/notesMaster1.xml><?xml version="1.0" encoding="utf-8"?>
+<p:notesMaster xmlns:a="http://schemas.openxmlformats.org/drawingml/2006/main" xmlns:r="http://schemas.openxmlformats.org/officeDocument/2006/relationships" xmlns:p="http://schemas.openxmlformats.org/presentationml/2006/main">
+  <p:cSld>
+    <p:bg>
+      <p:bgRef idx="1001">
+        <a:schemeClr val="bg1"/>
+      </p:bgRef>
+    </p:bg>
+    <p:spTree>
+      <p:nvGrpSpPr>
+        <p:cNvPr id="1" name=""/>
+        <p:cNvGrpSpPr/>
+        <p:nvPr/>
+      </p:nvGrpSpPr>
+      <p:grpSpPr>
+        <a:xfrm>
+          <a:off x="0" y="0"/>
+          <a:ext cx="0" cy="0"/>
+          <a:chOff x="0" y="0"/>
+          <a:chExt cx="0" cy="0"/>
+        </a:xfrm>
+      </p:grpSpPr>
+      <p:sp>
+        <p:nvSpPr>
+          <p:cNvPr id="2" name="Header Placeholder 1"/>
+          <p:cNvSpPr>
+            <a:spLocks noGrp="1"/>
+          </p:cNvSpPr>
+          <p:nvPr>
+            <p:ph type="hdr" sz="quarter"/>
+          </p:nvPr>
+        </p:nvSpPr>
+        <p:spPr>
+          <a:xfrm>
+            <a:off x="0" y="0"/>
+            <a:ext cx="2971800" cy="458788"/>
+          </a:xfrm>
+          <a:prstGeom prst="rect">
+            <a:avLst/>
+          </a:prstGeom>
+        </p:spPr>
+        <p:txBody>
+          <a:bodyPr vert="horz" lIns="91440" tIns="45720" rIns="91440" bIns="45720" rtlCol="0"/>
+          <a:lstStyle>
+            <a:lvl1pPr algn="l">
+              <a:defRPr sz="1200"/>
+            </a:lvl1pPr>
+          </a:lstStyle>
+          <a:p>
+            <a:endParaRPr lang="en-US"/>
+          </a:p>
+        </p:txBody>
+      </p:sp>
+      <p:sp>
+        <p:nvSpPr>
+          <p:cNvPr id="3" name="Date Placeholder 2"/>
+          <p:cNvSpPr>
+            <a:spLocks noGrp="1"/>
+          </p:cNvSpPr>
+          <p:nvPr>
+            <p:ph type="dt" idx="1"/>
+          </p:nvPr>
+        </p:nvSpPr>
+        <p:spPr>
+          <a:xfrm>
+            <a:off x="3884613" y="0"/>
+            <a:ext cx="2971800" cy="458788"/>
+          </a:xfrm>
+          <a:prstGeom prst="rect">
+            <a:avLst/>
+          </a:prstGeom>
+        </p:spPr>
+        <p:txBody>
+          <a:bodyPr vert="horz" lIns="91440" tIns="45720" rIns="91440" bIns="45720" rtlCol="0"/>
+          <a:lstStyle>
+            <a:lvl1pPr algn="r">
+              <a:defRPr sz="1200"/>
+            </a:lvl1pPr>
+          </a:lstStyle>
+          <a:p>
+            <a:fld id="{D1A7AE60-8256-F14E-9EB4-94FADFD335EB}" type="datetimeFigureOut">
+              <a:rPr lang="en-US" smtClean="0"/>
+              <a:t>12/13/25</a:t>
+            </a:fld>
+            <a:endParaRPr lang="en-US"/>
+          </a:p>
+        </p:txBody>
+      </p:sp>
+      <p:sp>
+        <p:nvSpPr>
+          <p:cNvPr id="4" name="Slide Image Placeholder 3"/>
+          <p:cNvSpPr>
+            <a:spLocks noGrp="1" noRot="1" noChangeAspect="1"/>
+          </p:cNvSpPr>
+          <p:nvPr>
+            <p:ph type="sldImg" idx="2"/>
+          </p:nvPr>
+        </p:nvSpPr>
+        <p:spPr>
+          <a:xfrm>
+            <a:off x="1412875" y="1143000"/>
+            <a:ext cx="4032250" cy="3086100"/>
+          </a:xfrm>
+          <a:prstGeom prst="rect">
+            <a:avLst/>
+          </a:prstGeom>
+          <a:noFill/>
+          <a:ln w="12700">
+            <a:solidFill>
+              <a:prstClr val="black"/>
+            </a:solidFill>
+          </a:ln>
+        </p:spPr>
+        <p:txBody>
+          <a:bodyPr vert="horz" lIns="91440" tIns="45720" rIns="91440" bIns="45720" rtlCol="0" anchor="ctr"/>
+          <a:lstStyle/>
+          <a:p>
+            <a:endParaRPr lang="en-US"/>
+          </a:p>
+        </p:txBody>
+      </p:sp>
+      <p:sp>
+        <p:nvSpPr>
+          <p:cNvPr id="5" name="Notes Placeholder 4"/>
+          <p:cNvSpPr>
+            <a:spLocks noGrp="1"/>
+          </p:cNvSpPr>
+          <p:nvPr>
+            <p:ph type="body" sz="quarter" idx="3"/>
+          </p:nvPr>
+        </p:nvSpPr>
+        <p:spPr>
+          <a:xfrm>
+            <a:off x="685800" y="4400550"/>
+            <a:ext cx="5486400" cy="3600450"/>
+          </a:xfrm>
+          <a:prstGeom prst="rect">
+            <a:avLst/>
+          </a:prstGeom>
+        </p:spPr>
+        <p:txBody>
+          <a:bodyPr vert="horz" lIns="91440" tIns="45720" rIns="91440" bIns="45720" rtlCol="0"/>
+          <a:lstStyle/>
+          <a:p>
+            <a:pPr lvl="0"/>
+            <a:r>
+              <a:rPr lang="en-US"/>
+              <a:t>Click to edit Master text styles</a:t>
+            </a:r>
+          </a:p>
+          <a:p>
+            <a:pPr lvl="1"/>
+            <a:r>
+              <a:rPr lang="en-US"/>
+              <a:t>Second level</a:t>
+            </a:r>
+          </a:p>
+          <a:p>
+            <a:pPr lvl="2"/>
+            <a:r>
+              <a:rPr lang="en-US"/>
+              <a:t>Third level</a:t>
+            </a:r>
+          </a:p>
+          <a:p>
+            <a:pPr lvl="3"/>
+            <a:r>
+              <a:rPr lang="en-US"/>
+              <a:t>Fourth level</a:t>
+            </a:r>
+          </a:p>
+          <a:p>
+            <a:pPr lvl="4"/>
+            <a:r>
+              <a:rPr lang="en-US"/>
+              <a:t>Fifth level</a:t>
+            </a:r>
+          </a:p>
+        </p:txBody>
+      </p:sp>
+      <p:sp>
+        <p:nvSpPr>
+          <p:cNvPr id="6" name="Footer Placeholder 5"/>
+          <p:cNvSpPr>
+            <a:spLocks noGrp="1"/>
+          </p:cNvSpPr>
+          <p:nvPr>
+            <p:ph type="ftr" sz="quarter" idx="4"/>
+          </p:nvPr>
+        </p:nvSpPr>
+        <p:spPr>
+          <a:xfrm>
+            <a:off x="0" y="8685213"/>
+            <a:ext cx="2971800" cy="458787"/>
+          </a:xfrm>
+          <a:prstGeom prst="rect">
+            <a:avLst/>
+          </a:prstGeom>
+        </p:spPr>
+        <p:txBody>
+          <a:bodyPr vert="horz" lIns="91440" tIns="45720" rIns="91440" bIns="45720" rtlCol="0" anchor="b"/>
+          <a:lstStyle>
+            <a:lvl1pPr algn="l">
+              <a:defRPr sz="1200"/>
+            </a:lvl1pPr>
+          </a:lstStyle>
+          <a:p>
+            <a:endParaRPr lang="en-US"/>
+          </a:p>
+        </p:txBody>
+      </p:sp>
+      <p:sp>
+        <p:nvSpPr>
+          <p:cNvPr id="7" name="Slide Number Placeholder 6"/>
+          <p:cNvSpPr>
+            <a:spLocks noGrp="1"/>
+          </p:cNvSpPr>
+          <p:nvPr>
+            <p:ph type="sldNum" sz="quarter" idx="5"/>
+          </p:nvPr>
+        </p:nvSpPr>
+        <p:spPr>
+          <a:xfrm>
+            <a:off x="3884613" y="8685213"/>
+            <a:ext cx="2971800" cy="458787"/>
+          </a:xfrm>
+          <a:prstGeom prst="rect">
+            <a:avLst/>
+          </a:prstGeom>
+        </p:spPr>
+        <p:txBody>
+          <a:bodyPr vert="horz" lIns="91440" tIns="45720" rIns="91440" bIns="45720" rtlCol="0" anchor="b"/>
+          <a:lstStyle>
+            <a:lvl1pPr algn="r">
+              <a:defRPr sz="1200"/>
+            </a:lvl1pPr>
+          </a:lstStyle>
+          <a:p>
+            <a:fld id="{51AC7242-A353-7C48-AE5E-C41FCE31657F}" type="slidenum">
+              <a:rPr lang="en-US" smtClean="0"/>
+              <a:t>‹#›</a:t>
+            </a:fld>
+            <a:endParaRPr lang="en-US"/>
+          </a:p>
+        </p:txBody>
+      </p:sp>
+    </p:spTree>
+    <p:extLst>
+      <p:ext uri="{BB962C8B-B14F-4D97-AF65-F5344CB8AC3E}">
+        <p14:creationId xmlns:p14="http://schemas.microsoft.com/office/powerpoint/2010/main" val="3287242950"/>
+      </p:ext>
+    </p:extLst>
+  </p:cSld>
+  <p:clrMap bg1="lt1" tx1="dk1" bg2="lt2" tx2="dk2" accent1="accent1" accent2="accent2" accent3="accent3" accent4="accent4" accent5="accent5" accent6="accent6" hlink="hlink" folHlink="folHlink"/>
+  <p:notesStyle>
+    <a:lvl1pPr marL="0" algn="l" defTabSz="914400" rtl="0" eaLnBrk="1" latinLnBrk="0" hangingPunct="1">
+      <a:defRPr sz="1200" kern="1200">
+        <a:solidFill>
+          <a:schemeClr val="tx1"/>
+        </a:solidFill>
+        <a:latin typeface="+mn-lt"/>
+        <a:ea typeface="+mn-ea"/>
+        <a:cs typeface="+mn-cs"/>
+      </a:defRPr>
+    </a:lvl1pPr>
+    <a:lvl2pPr marL="457200" algn="l" defTabSz="914400" rtl="0" eaLnBrk="1" latinLnBrk="0" hangingPunct="1">
+      <a:defRPr sz="1200" kern="1200">
+        <a:solidFill>
+          <a:schemeClr val="tx1"/>
+        </a:solidFill>
+        <a:latin typeface="+mn-lt"/>
+        <a:ea typeface="+mn-ea"/>
+        <a:cs typeface="+mn-cs"/>
+      </a:defRPr>
+    </a:lvl2pPr>
+    <a:lvl3pPr marL="914400" algn="l" defTabSz="914400" rtl="0" eaLnBrk="1" latinLnBrk="0" hangingPunct="1">
+      <a:defRPr sz="1200" kern="1200">
+        <a:solidFill>
+          <a:schemeClr val="tx1"/>
+        </a:solidFill>
+        <a:latin typeface="+mn-lt"/>
+        <a:ea typeface="+mn-ea"/>
+        <a:cs typeface="+mn-cs"/>
+      </a:defRPr>
+    </a:lvl3pPr>
+    <a:lvl4pPr marL="1371600" algn="l" defTabSz="914400" rtl="0" eaLnBrk="1" latinLnBrk="0" hangingPunct="1">
+      <a:defRPr sz="1200" kern="1200">
+        <a:solidFill>
+          <a:schemeClr val="tx1"/>
+        </a:solidFill>
+        <a:latin typeface="+mn-lt"/>
+        <a:ea typeface="+mn-ea"/>
+        <a:cs typeface="+mn-cs"/>
+      </a:defRPr>
+    </a:lvl4pPr>
+    <a:lvl5pPr marL="1828800" algn="l" defTabSz="914400" rtl="0" eaLnBrk="1" latinLnBrk="0" hangingPunct="1">
+      <a:defRPr sz="1200" kern="1200">
+        <a:solidFill>
+          <a:schemeClr val="tx1"/>
+        </a:solidFill>
+        <a:latin typeface="+mn-lt"/>
+        <a:ea typeface="+mn-ea"/>
+        <a:cs typeface="+mn-cs"/>
+      </a:defRPr>
+    </a:lvl5pPr>
+    <a:lvl6pPr marL="2286000" algn="l" defTabSz="914400" rtl="0" eaLnBrk="1" latinLnBrk="0" hangingPunct="1">
+      <a:defRPr sz="1200" kern="1200">
+        <a:solidFill>
+          <a:schemeClr val="tx1"/>
+        </a:solidFill>
+        <a:latin typeface="+mn-lt"/>
+        <a:ea typeface="+mn-ea"/>
+        <a:cs typeface="+mn-cs"/>
+      </a:defRPr>
+    </a:lvl6pPr>
+    <a:lvl7pPr marL="2743200" algn="l" defTabSz="914400" rtl="0" eaLnBrk="1" latinLnBrk="0" hangingPunct="1">
+      <a:defRPr sz="1200" kern="1200">
+        <a:solidFill>
+          <a:schemeClr val="tx1"/>
+        </a:solidFill>
+        <a:latin typeface="+mn-lt"/>
+        <a:ea typeface="+mn-ea"/>
+        <a:cs typeface="+mn-cs"/>
+      </a:defRPr>
+    </a:lvl7pPr>
+    <a:lvl8pPr marL="3200400" algn="l" defTabSz="914400" rtl="0" eaLnBrk="1" latinLnBrk="0" hangingPunct="1">
+      <a:defRPr sz="1200" kern="1200">
+        <a:solidFill>
+          <a:schemeClr val="tx1"/>
+        </a:solidFill>
+        <a:latin typeface="+mn-lt"/>
+        <a:ea typeface="+mn-ea"/>
+        <a:cs typeface="+mn-cs"/>
+      </a:defRPr>
+    </a:lvl8pPr>
+    <a:lvl9pPr marL="3657600" algn="l" defTabSz="914400" rtl="0" eaLnBrk="1" latinLnBrk="0" hangingPunct="1">
+      <a:defRPr sz="1200" kern="1200">
+        <a:solidFill>
+          <a:schemeClr val="tx1"/>
+        </a:solidFill>
+        <a:latin typeface="+mn-lt"/>
+        <a:ea typeface="+mn-ea"/>
+        <a:cs typeface="+mn-cs"/>
+      </a:defRPr>
+    </a:lvl9pPr>
+  </p:notesStyle>
+</p:notesMaster>
+</file>
+
+<file path=ppt/notesSlides/notesSlide1.xml><?xml version="1.0" encoding="utf-8"?>
+<p:notes xmlns:a="http://schemas.openxmlformats.org/drawingml/2006/main" xmlns:r="http://schemas.openxmlformats.org/officeDocument/2006/relationships" xmlns:p="http://schemas.openxmlformats.org/presentationml/2006/main">
+  <p:cSld>
+    <p:spTree>
+      <p:nvGrpSpPr>
+        <p:cNvPr id="1" name=""/>
+        <p:cNvGrpSpPr/>
+        <p:nvPr/>
+      </p:nvGrpSpPr>
+      <p:grpSpPr>
+        <a:xfrm>
+          <a:off x="0" y="0"/>
+          <a:ext cx="0" cy="0"/>
+          <a:chOff x="0" y="0"/>
+          <a:chExt cx="0" cy="0"/>
+        </a:xfrm>
+      </p:grpSpPr>
+      <p:sp>
+        <p:nvSpPr>
+          <p:cNvPr id="2" name="Slide Image Placeholder 1"/>
+          <p:cNvSpPr>
+            <a:spLocks noGrp="1" noRot="1" noChangeAspect="1"/>
+          </p:cNvSpPr>
+          <p:nvPr>
+            <p:ph type="sldImg"/>
+          </p:nvPr>
+        </p:nvSpPr>
+        <p:spPr/>
+      </p:sp>
+      <p:sp>
+        <p:nvSpPr>
+          <p:cNvPr id="3" name="Notes Placeholder 2"/>
+          <p:cNvSpPr>
+            <a:spLocks noGrp="1"/>
+          </p:cNvSpPr>
+          <p:nvPr>
+            <p:ph type="body" idx="1"/>
+          </p:nvPr>
+        </p:nvSpPr>
+        <p:spPr/>
+        <p:txBody>
+          <a:bodyPr/>
+          <a:lstStyle/>
+          <a:p>
+            <a:endParaRPr lang="en-US"/>
+          </a:p>
+        </p:txBody>
+      </p:sp>
+      <p:sp>
+        <p:nvSpPr>
+          <p:cNvPr id="4" name="Slide Number Placeholder 3"/>
+          <p:cNvSpPr>
+            <a:spLocks noGrp="1"/>
+          </p:cNvSpPr>
+          <p:nvPr>
+            <p:ph type="sldNum" sz="quarter" idx="5"/>
+          </p:nvPr>
+        </p:nvSpPr>
+        <p:spPr/>
+        <p:txBody>
+          <a:bodyPr/>
+          <a:lstStyle/>
+          <a:p>
+            <a:fld id="{51AC7242-A353-7C48-AE5E-C41FCE31657F}" type="slidenum">
+              <a:rPr lang="en-US" smtClean="0"/>
+              <a:t>1</a:t>
+            </a:fld>
+            <a:endParaRPr lang="en-US"/>
+          </a:p>
+        </p:txBody>
+      </p:sp>
+    </p:spTree>
+    <p:extLst>
+      <p:ext uri="{BB962C8B-B14F-4D97-AF65-F5344CB8AC3E}">
+        <p14:creationId xmlns:p14="http://schemas.microsoft.com/office/powerpoint/2010/main" val="1920205250"/>
+      </p:ext>
+    </p:extLst>
+  </p:cSld>
+  <p:clrMapOvr>
+    <a:masterClrMapping/>
+  </p:clrMapOvr>
+</p:notes>
 </file>
 
 <file path=ppt/slideLayouts/slideLayout1.xml><?xml version="1.0" encoding="utf-8"?>
@@ -2988,7 +3426,7 @@
           <p:nvPr/>
         </p:nvPicPr>
         <p:blipFill>
-          <a:blip r:embed="rId2"/>
+          <a:blip r:embed="rId3"/>
           <a:stretch>
             <a:fillRect/>
           </a:stretch>
@@ -3165,25 +3603,1349 @@
           </a:p>
         </p:txBody>
       </p:sp>
+    </p:spTree>
+    <p:extLst>
+      <p:ext uri="{BB962C8B-B14F-4D97-AF65-F5344CB8AC3E}">
+        <p14:creationId xmlns:p14="http://schemas.microsoft.com/office/powerpoint/2010/main" val="2075628722"/>
+      </p:ext>
+    </p:extLst>
+  </p:cSld>
+  <p:clrMapOvr>
+    <a:masterClrMapping/>
+  </p:clrMapOvr>
+</p:sld>
+</file>
+
+<file path=ppt/slides/slide2.xml><?xml version="1.0" encoding="utf-8"?>
+<p:sld xmlns:a="http://schemas.openxmlformats.org/drawingml/2006/main" xmlns:r="http://schemas.openxmlformats.org/officeDocument/2006/relationships" xmlns:p="http://schemas.openxmlformats.org/presentationml/2006/main">
+  <p:cSld>
+    <p:spTree>
+      <p:nvGrpSpPr>
+        <p:cNvPr id="1" name="">
+          <a:extLst>
+            <a:ext uri="{FF2B5EF4-FFF2-40B4-BE49-F238E27FC236}">
+              <a16:creationId xmlns:a16="http://schemas.microsoft.com/office/drawing/2014/main" id="{267767E5-957F-6421-D1CF-BB3D80CA804C}"/>
+            </a:ext>
+          </a:extLst>
+        </p:cNvPr>
+        <p:cNvGrpSpPr/>
+        <p:nvPr/>
+      </p:nvGrpSpPr>
+      <p:grpSpPr>
+        <a:xfrm>
+          <a:off x="0" y="0"/>
+          <a:ext cx="0" cy="0"/>
+          <a:chOff x="0" y="0"/>
+          <a:chExt cx="0" cy="0"/>
+        </a:xfrm>
+      </p:grpSpPr>
+      <p:pic>
+        <p:nvPicPr>
+          <p:cNvPr id="6" name="Picture 5" descr="A game of a board game&#10;&#10;AI-generated content may be incorrect.">
+            <a:extLst>
+              <a:ext uri="{FF2B5EF4-FFF2-40B4-BE49-F238E27FC236}">
+                <a16:creationId xmlns:a16="http://schemas.microsoft.com/office/drawing/2014/main" id="{07B47418-D4B8-F8F6-CFA0-20A05114F228}"/>
+              </a:ext>
+            </a:extLst>
+          </p:cNvPr>
+          <p:cNvPicPr>
+            <a:picLocks noChangeAspect="1"/>
+          </p:cNvPicPr>
+          <p:nvPr/>
+        </p:nvPicPr>
+        <p:blipFill>
+          <a:blip r:embed="rId2"/>
+          <a:stretch>
+            <a:fillRect/>
+          </a:stretch>
+        </p:blipFill>
+        <p:spPr>
+          <a:xfrm>
+            <a:off x="1" y="0"/>
+            <a:ext cx="8964707" cy="6858000"/>
+          </a:xfrm>
+          <a:prstGeom prst="rect">
+            <a:avLst/>
+          </a:prstGeom>
+        </p:spPr>
+      </p:pic>
+      <p:sp>
+        <p:nvSpPr>
+          <p:cNvPr id="7" name="Rectangle 6">
+            <a:extLst>
+              <a:ext uri="{FF2B5EF4-FFF2-40B4-BE49-F238E27FC236}">
+                <a16:creationId xmlns:a16="http://schemas.microsoft.com/office/drawing/2014/main" id="{E723DD54-91B4-F4CF-2DD4-67CC799504D2}"/>
+              </a:ext>
+            </a:extLst>
+          </p:cNvPr>
+          <p:cNvSpPr/>
+          <p:nvPr/>
+        </p:nvSpPr>
+        <p:spPr>
+          <a:xfrm rot="1979634">
+            <a:off x="-131765" y="3372644"/>
+            <a:ext cx="6582822" cy="2574389"/>
+          </a:xfrm>
+          <a:prstGeom prst="rect">
+            <a:avLst/>
+          </a:prstGeom>
+          <a:solidFill>
+            <a:schemeClr val="accent1">
+              <a:alpha val="20000"/>
+            </a:schemeClr>
+          </a:solidFill>
+          <a:ln>
+            <a:noFill/>
+          </a:ln>
+        </p:spPr>
+        <p:style>
+          <a:lnRef idx="2">
+            <a:schemeClr val="accent1">
+              <a:shade val="15000"/>
+            </a:schemeClr>
+          </a:lnRef>
+          <a:fillRef idx="1">
+            <a:schemeClr val="accent1"/>
+          </a:fillRef>
+          <a:effectRef idx="0">
+            <a:schemeClr val="accent1"/>
+          </a:effectRef>
+          <a:fontRef idx="minor">
+            <a:schemeClr val="lt1"/>
+          </a:fontRef>
+        </p:style>
+        <p:txBody>
+          <a:bodyPr rtlCol="0" anchor="ctr"/>
+          <a:lstStyle/>
+          <a:p>
+            <a:pPr algn="ctr"/>
+            <a:endParaRPr lang="en-US"/>
+          </a:p>
+        </p:txBody>
+      </p:sp>
+      <p:sp>
+        <p:nvSpPr>
+          <p:cNvPr id="8" name="Rectangle 7">
+            <a:extLst>
+              <a:ext uri="{FF2B5EF4-FFF2-40B4-BE49-F238E27FC236}">
+                <a16:creationId xmlns:a16="http://schemas.microsoft.com/office/drawing/2014/main" id="{0C690EAD-DE29-F77F-5C06-B5683FD2CE33}"/>
+              </a:ext>
+            </a:extLst>
+          </p:cNvPr>
+          <p:cNvSpPr/>
+          <p:nvPr/>
+        </p:nvSpPr>
+        <p:spPr>
+          <a:xfrm rot="1979634">
+            <a:off x="1896508" y="385411"/>
+            <a:ext cx="6558877" cy="2337741"/>
+          </a:xfrm>
+          <a:prstGeom prst="rect">
+            <a:avLst/>
+          </a:prstGeom>
+          <a:solidFill>
+            <a:schemeClr val="accent5">
+              <a:alpha val="20000"/>
+            </a:schemeClr>
+          </a:solidFill>
+          <a:ln>
+            <a:noFill/>
+          </a:ln>
+        </p:spPr>
+        <p:style>
+          <a:lnRef idx="2">
+            <a:schemeClr val="accent1">
+              <a:shade val="15000"/>
+            </a:schemeClr>
+          </a:lnRef>
+          <a:fillRef idx="1">
+            <a:schemeClr val="accent1"/>
+          </a:fillRef>
+          <a:effectRef idx="0">
+            <a:schemeClr val="accent1"/>
+          </a:effectRef>
+          <a:fontRef idx="minor">
+            <a:schemeClr val="lt1"/>
+          </a:fontRef>
+        </p:style>
+        <p:txBody>
+          <a:bodyPr rtlCol="0" anchor="ctr"/>
+          <a:lstStyle/>
+          <a:p>
+            <a:pPr algn="ctr"/>
+            <a:endParaRPr lang="en-US"/>
+          </a:p>
+        </p:txBody>
+      </p:sp>
+      <p:sp>
+        <p:nvSpPr>
+          <p:cNvPr id="9" name="Rectangle 8">
+            <a:extLst>
+              <a:ext uri="{FF2B5EF4-FFF2-40B4-BE49-F238E27FC236}">
+                <a16:creationId xmlns:a16="http://schemas.microsoft.com/office/drawing/2014/main" id="{076092E0-E58E-1490-3913-F4816069B0F6}"/>
+              </a:ext>
+            </a:extLst>
+          </p:cNvPr>
+          <p:cNvSpPr/>
+          <p:nvPr/>
+        </p:nvSpPr>
+        <p:spPr>
+          <a:xfrm rot="1979634">
+            <a:off x="901795" y="2449619"/>
+            <a:ext cx="6568256" cy="1204578"/>
+          </a:xfrm>
+          <a:prstGeom prst="rect">
+            <a:avLst/>
+          </a:prstGeom>
+          <a:solidFill>
+            <a:schemeClr val="accent2">
+              <a:alpha val="20000"/>
+            </a:schemeClr>
+          </a:solidFill>
+          <a:ln>
+            <a:noFill/>
+          </a:ln>
+        </p:spPr>
+        <p:style>
+          <a:lnRef idx="2">
+            <a:schemeClr val="accent1">
+              <a:shade val="15000"/>
+            </a:schemeClr>
+          </a:lnRef>
+          <a:fillRef idx="1">
+            <a:schemeClr val="accent1"/>
+          </a:fillRef>
+          <a:effectRef idx="0">
+            <a:schemeClr val="accent1"/>
+          </a:effectRef>
+          <a:fontRef idx="minor">
+            <a:schemeClr val="lt1"/>
+          </a:fontRef>
+        </p:style>
+        <p:txBody>
+          <a:bodyPr rtlCol="0" anchor="ctr"/>
+          <a:lstStyle/>
+          <a:p>
+            <a:pPr algn="ctr"/>
+            <a:endParaRPr lang="en-US"/>
+          </a:p>
+        </p:txBody>
+      </p:sp>
+      <p:sp>
+        <p:nvSpPr>
+          <p:cNvPr id="2" name="Oval 1">
+            <a:extLst>
+              <a:ext uri="{FF2B5EF4-FFF2-40B4-BE49-F238E27FC236}">
+                <a16:creationId xmlns:a16="http://schemas.microsoft.com/office/drawing/2014/main" id="{A66448F9-5370-40F2-8B59-0DF5858027EB}"/>
+              </a:ext>
+            </a:extLst>
+          </p:cNvPr>
+          <p:cNvSpPr/>
+          <p:nvPr/>
+        </p:nvSpPr>
+        <p:spPr>
+          <a:xfrm>
+            <a:off x="784617" y="3831367"/>
+            <a:ext cx="489097" cy="489097"/>
+          </a:xfrm>
+          <a:prstGeom prst="ellipse">
+            <a:avLst/>
+          </a:prstGeom>
+        </p:spPr>
+        <p:style>
+          <a:lnRef idx="2">
+            <a:schemeClr val="dk1">
+              <a:shade val="15000"/>
+            </a:schemeClr>
+          </a:lnRef>
+          <a:fillRef idx="1">
+            <a:schemeClr val="dk1"/>
+          </a:fillRef>
+          <a:effectRef idx="0">
+            <a:schemeClr val="dk1"/>
+          </a:effectRef>
+          <a:fontRef idx="minor">
+            <a:schemeClr val="lt1"/>
+          </a:fontRef>
+        </p:style>
+        <p:txBody>
+          <a:bodyPr rtlCol="0" anchor="ctr"/>
+          <a:lstStyle/>
+          <a:p>
+            <a:pPr algn="ctr"/>
+            <a:endParaRPr lang="en-US"/>
+          </a:p>
+        </p:txBody>
+      </p:sp>
+      <p:sp>
+        <p:nvSpPr>
+          <p:cNvPr id="3" name="Oval 2">
+            <a:extLst>
+              <a:ext uri="{FF2B5EF4-FFF2-40B4-BE49-F238E27FC236}">
+                <a16:creationId xmlns:a16="http://schemas.microsoft.com/office/drawing/2014/main" id="{9358652C-3A30-CC8C-89FC-CA6F0693B4A0}"/>
+              </a:ext>
+            </a:extLst>
+          </p:cNvPr>
+          <p:cNvSpPr/>
+          <p:nvPr/>
+        </p:nvSpPr>
+        <p:spPr>
+          <a:xfrm>
+            <a:off x="712521" y="2668487"/>
+            <a:ext cx="489097" cy="489097"/>
+          </a:xfrm>
+          <a:prstGeom prst="ellipse">
+            <a:avLst/>
+          </a:prstGeom>
+        </p:spPr>
+        <p:style>
+          <a:lnRef idx="2">
+            <a:schemeClr val="dk1">
+              <a:shade val="15000"/>
+            </a:schemeClr>
+          </a:lnRef>
+          <a:fillRef idx="1">
+            <a:schemeClr val="dk1"/>
+          </a:fillRef>
+          <a:effectRef idx="0">
+            <a:schemeClr val="dk1"/>
+          </a:effectRef>
+          <a:fontRef idx="minor">
+            <a:schemeClr val="lt1"/>
+          </a:fontRef>
+        </p:style>
+        <p:txBody>
+          <a:bodyPr rtlCol="0" anchor="ctr"/>
+          <a:lstStyle/>
+          <a:p>
+            <a:pPr algn="ctr"/>
+            <a:endParaRPr lang="en-US"/>
+          </a:p>
+        </p:txBody>
+      </p:sp>
+      <p:sp>
+        <p:nvSpPr>
+          <p:cNvPr id="4" name="Oval 3">
+            <a:extLst>
+              <a:ext uri="{FF2B5EF4-FFF2-40B4-BE49-F238E27FC236}">
+                <a16:creationId xmlns:a16="http://schemas.microsoft.com/office/drawing/2014/main" id="{07EFC14B-3810-B57A-89B8-A72A6E8DD541}"/>
+              </a:ext>
+            </a:extLst>
+          </p:cNvPr>
+          <p:cNvSpPr/>
+          <p:nvPr/>
+        </p:nvSpPr>
+        <p:spPr>
+          <a:xfrm>
+            <a:off x="2128829" y="3051908"/>
+            <a:ext cx="489097" cy="489097"/>
+          </a:xfrm>
+          <a:prstGeom prst="ellipse">
+            <a:avLst/>
+          </a:prstGeom>
+        </p:spPr>
+        <p:style>
+          <a:lnRef idx="2">
+            <a:schemeClr val="dk1">
+              <a:shade val="15000"/>
+            </a:schemeClr>
+          </a:lnRef>
+          <a:fillRef idx="1">
+            <a:schemeClr val="dk1"/>
+          </a:fillRef>
+          <a:effectRef idx="0">
+            <a:schemeClr val="dk1"/>
+          </a:effectRef>
+          <a:fontRef idx="minor">
+            <a:schemeClr val="lt1"/>
+          </a:fontRef>
+        </p:style>
+        <p:txBody>
+          <a:bodyPr rtlCol="0" anchor="ctr"/>
+          <a:lstStyle/>
+          <a:p>
+            <a:pPr algn="ctr"/>
+            <a:endParaRPr lang="en-US"/>
+          </a:p>
+        </p:txBody>
+      </p:sp>
+      <p:sp>
+        <p:nvSpPr>
+          <p:cNvPr id="5" name="Oval 4">
+            <a:extLst>
+              <a:ext uri="{FF2B5EF4-FFF2-40B4-BE49-F238E27FC236}">
+                <a16:creationId xmlns:a16="http://schemas.microsoft.com/office/drawing/2014/main" id="{1C7610ED-039A-7EBE-2EF0-CC0893D91D42}"/>
+              </a:ext>
+            </a:extLst>
+          </p:cNvPr>
+          <p:cNvSpPr/>
+          <p:nvPr/>
+        </p:nvSpPr>
+        <p:spPr>
+          <a:xfrm>
+            <a:off x="1884280" y="4948683"/>
+            <a:ext cx="489097" cy="489097"/>
+          </a:xfrm>
+          <a:prstGeom prst="ellipse">
+            <a:avLst/>
+          </a:prstGeom>
+        </p:spPr>
+        <p:style>
+          <a:lnRef idx="2">
+            <a:schemeClr val="dk1">
+              <a:shade val="15000"/>
+            </a:schemeClr>
+          </a:lnRef>
+          <a:fillRef idx="1">
+            <a:schemeClr val="dk1"/>
+          </a:fillRef>
+          <a:effectRef idx="0">
+            <a:schemeClr val="dk1"/>
+          </a:effectRef>
+          <a:fontRef idx="minor">
+            <a:schemeClr val="lt1"/>
+          </a:fontRef>
+        </p:style>
+        <p:txBody>
+          <a:bodyPr rtlCol="0" anchor="ctr"/>
+          <a:lstStyle/>
+          <a:p>
+            <a:pPr algn="ctr"/>
+            <a:endParaRPr lang="en-US"/>
+          </a:p>
+        </p:txBody>
+      </p:sp>
+      <p:sp>
+        <p:nvSpPr>
+          <p:cNvPr id="10" name="Oval 9">
+            <a:extLst>
+              <a:ext uri="{FF2B5EF4-FFF2-40B4-BE49-F238E27FC236}">
+                <a16:creationId xmlns:a16="http://schemas.microsoft.com/office/drawing/2014/main" id="{09CC1A9F-20E5-9310-45BB-1981DABC5368}"/>
+              </a:ext>
+            </a:extLst>
+          </p:cNvPr>
+          <p:cNvSpPr/>
+          <p:nvPr/>
+        </p:nvSpPr>
+        <p:spPr>
+          <a:xfrm>
+            <a:off x="3453233" y="5147060"/>
+            <a:ext cx="489097" cy="489097"/>
+          </a:xfrm>
+          <a:prstGeom prst="ellipse">
+            <a:avLst/>
+          </a:prstGeom>
+        </p:spPr>
+        <p:style>
+          <a:lnRef idx="2">
+            <a:schemeClr val="dk1">
+              <a:shade val="15000"/>
+            </a:schemeClr>
+          </a:lnRef>
+          <a:fillRef idx="1">
+            <a:schemeClr val="dk1"/>
+          </a:fillRef>
+          <a:effectRef idx="0">
+            <a:schemeClr val="dk1"/>
+          </a:effectRef>
+          <a:fontRef idx="minor">
+            <a:schemeClr val="lt1"/>
+          </a:fontRef>
+        </p:style>
+        <p:txBody>
+          <a:bodyPr rtlCol="0" anchor="ctr"/>
+          <a:lstStyle/>
+          <a:p>
+            <a:pPr algn="ctr"/>
+            <a:endParaRPr lang="en-US"/>
+          </a:p>
+        </p:txBody>
+      </p:sp>
+      <p:sp>
+        <p:nvSpPr>
+          <p:cNvPr id="11" name="Oval 10">
+            <a:extLst>
+              <a:ext uri="{FF2B5EF4-FFF2-40B4-BE49-F238E27FC236}">
+                <a16:creationId xmlns:a16="http://schemas.microsoft.com/office/drawing/2014/main" id="{33EB7E5A-A40E-D783-01A6-575A253C9096}"/>
+              </a:ext>
+            </a:extLst>
+          </p:cNvPr>
+          <p:cNvSpPr/>
+          <p:nvPr/>
+        </p:nvSpPr>
+        <p:spPr>
+          <a:xfrm>
+            <a:off x="3453233" y="3976727"/>
+            <a:ext cx="489097" cy="489097"/>
+          </a:xfrm>
+          <a:prstGeom prst="ellipse">
+            <a:avLst/>
+          </a:prstGeom>
+        </p:spPr>
+        <p:style>
+          <a:lnRef idx="2">
+            <a:schemeClr val="dk1">
+              <a:shade val="15000"/>
+            </a:schemeClr>
+          </a:lnRef>
+          <a:fillRef idx="1">
+            <a:schemeClr val="dk1"/>
+          </a:fillRef>
+          <a:effectRef idx="0">
+            <a:schemeClr val="dk1"/>
+          </a:effectRef>
+          <a:fontRef idx="minor">
+            <a:schemeClr val="lt1"/>
+          </a:fontRef>
+        </p:style>
+        <p:txBody>
+          <a:bodyPr rtlCol="0" anchor="ctr"/>
+          <a:lstStyle/>
+          <a:p>
+            <a:pPr algn="ctr"/>
+            <a:endParaRPr lang="en-US"/>
+          </a:p>
+        </p:txBody>
+      </p:sp>
+      <p:sp>
+        <p:nvSpPr>
+          <p:cNvPr id="12" name="Oval 11">
+            <a:extLst>
+              <a:ext uri="{FF2B5EF4-FFF2-40B4-BE49-F238E27FC236}">
+                <a16:creationId xmlns:a16="http://schemas.microsoft.com/office/drawing/2014/main" id="{665944EC-5BDF-0C6F-0DCA-93E108862E59}"/>
+              </a:ext>
+            </a:extLst>
+          </p:cNvPr>
+          <p:cNvSpPr/>
+          <p:nvPr/>
+        </p:nvSpPr>
+        <p:spPr>
+          <a:xfrm>
+            <a:off x="5337512" y="4855586"/>
+            <a:ext cx="489097" cy="489097"/>
+          </a:xfrm>
+          <a:prstGeom prst="ellipse">
+            <a:avLst/>
+          </a:prstGeom>
+        </p:spPr>
+        <p:style>
+          <a:lnRef idx="2">
+            <a:schemeClr val="dk1">
+              <a:shade val="15000"/>
+            </a:schemeClr>
+          </a:lnRef>
+          <a:fillRef idx="1">
+            <a:schemeClr val="dk1"/>
+          </a:fillRef>
+          <a:effectRef idx="0">
+            <a:schemeClr val="dk1"/>
+          </a:effectRef>
+          <a:fontRef idx="minor">
+            <a:schemeClr val="lt1"/>
+          </a:fontRef>
+        </p:style>
+        <p:txBody>
+          <a:bodyPr rtlCol="0" anchor="ctr"/>
+          <a:lstStyle/>
+          <a:p>
+            <a:pPr algn="ctr"/>
+            <a:endParaRPr lang="en-US"/>
+          </a:p>
+        </p:txBody>
+      </p:sp>
+      <p:sp>
+        <p:nvSpPr>
+          <p:cNvPr id="13" name="Oval 12">
+            <a:extLst>
+              <a:ext uri="{FF2B5EF4-FFF2-40B4-BE49-F238E27FC236}">
+                <a16:creationId xmlns:a16="http://schemas.microsoft.com/office/drawing/2014/main" id="{38722853-5164-0CBD-4675-D08D67F55B77}"/>
+              </a:ext>
+            </a:extLst>
+          </p:cNvPr>
+          <p:cNvSpPr/>
+          <p:nvPr/>
+        </p:nvSpPr>
+        <p:spPr>
+          <a:xfrm>
+            <a:off x="1350321" y="1766778"/>
+            <a:ext cx="489097" cy="489097"/>
+          </a:xfrm>
+          <a:prstGeom prst="ellipse">
+            <a:avLst/>
+          </a:prstGeom>
+        </p:spPr>
+        <p:style>
+          <a:lnRef idx="2">
+            <a:schemeClr val="dk1">
+              <a:shade val="15000"/>
+            </a:schemeClr>
+          </a:lnRef>
+          <a:fillRef idx="1">
+            <a:schemeClr val="dk1"/>
+          </a:fillRef>
+          <a:effectRef idx="0">
+            <a:schemeClr val="dk1"/>
+          </a:effectRef>
+          <a:fontRef idx="minor">
+            <a:schemeClr val="lt1"/>
+          </a:fontRef>
+        </p:style>
+        <p:txBody>
+          <a:bodyPr rtlCol="0" anchor="ctr"/>
+          <a:lstStyle/>
+          <a:p>
+            <a:pPr algn="ctr"/>
+            <a:endParaRPr lang="en-US"/>
+          </a:p>
+        </p:txBody>
+      </p:sp>
+      <p:sp>
+        <p:nvSpPr>
+          <p:cNvPr id="14" name="Oval 13">
+            <a:extLst>
+              <a:ext uri="{FF2B5EF4-FFF2-40B4-BE49-F238E27FC236}">
+                <a16:creationId xmlns:a16="http://schemas.microsoft.com/office/drawing/2014/main" id="{09CBFEB0-14FD-79B2-C542-56AB0F9CD587}"/>
+              </a:ext>
+            </a:extLst>
+          </p:cNvPr>
+          <p:cNvSpPr/>
+          <p:nvPr/>
+        </p:nvSpPr>
+        <p:spPr>
+          <a:xfrm>
+            <a:off x="2766629" y="1889153"/>
+            <a:ext cx="489097" cy="489097"/>
+          </a:xfrm>
+          <a:prstGeom prst="ellipse">
+            <a:avLst/>
+          </a:prstGeom>
+        </p:spPr>
+        <p:style>
+          <a:lnRef idx="2">
+            <a:schemeClr val="dk1">
+              <a:shade val="15000"/>
+            </a:schemeClr>
+          </a:lnRef>
+          <a:fillRef idx="1">
+            <a:schemeClr val="dk1"/>
+          </a:fillRef>
+          <a:effectRef idx="0">
+            <a:schemeClr val="dk1"/>
+          </a:effectRef>
+          <a:fontRef idx="minor">
+            <a:schemeClr val="lt1"/>
+          </a:fontRef>
+        </p:style>
+        <p:txBody>
+          <a:bodyPr rtlCol="0" anchor="ctr"/>
+          <a:lstStyle/>
+          <a:p>
+            <a:pPr algn="ctr"/>
+            <a:endParaRPr lang="en-US"/>
+          </a:p>
+        </p:txBody>
+      </p:sp>
+      <p:sp>
+        <p:nvSpPr>
+          <p:cNvPr id="15" name="Oval 14">
+            <a:extLst>
+              <a:ext uri="{FF2B5EF4-FFF2-40B4-BE49-F238E27FC236}">
+                <a16:creationId xmlns:a16="http://schemas.microsoft.com/office/drawing/2014/main" id="{8EAB67E2-4985-1A73-6563-33EA8D95B597}"/>
+              </a:ext>
+            </a:extLst>
+          </p:cNvPr>
+          <p:cNvSpPr/>
+          <p:nvPr/>
+        </p:nvSpPr>
+        <p:spPr>
+          <a:xfrm>
+            <a:off x="2766629" y="869562"/>
+            <a:ext cx="489097" cy="489097"/>
+          </a:xfrm>
+          <a:prstGeom prst="ellipse">
+            <a:avLst/>
+          </a:prstGeom>
+        </p:spPr>
+        <p:style>
+          <a:lnRef idx="2">
+            <a:schemeClr val="dk1">
+              <a:shade val="15000"/>
+            </a:schemeClr>
+          </a:lnRef>
+          <a:fillRef idx="1">
+            <a:schemeClr val="dk1"/>
+          </a:fillRef>
+          <a:effectRef idx="0">
+            <a:schemeClr val="dk1"/>
+          </a:effectRef>
+          <a:fontRef idx="minor">
+            <a:schemeClr val="lt1"/>
+          </a:fontRef>
+        </p:style>
+        <p:txBody>
+          <a:bodyPr rtlCol="0" anchor="ctr"/>
+          <a:lstStyle/>
+          <a:p>
+            <a:pPr algn="ctr"/>
+            <a:endParaRPr lang="en-US"/>
+          </a:p>
+        </p:txBody>
+      </p:sp>
+      <p:sp>
+        <p:nvSpPr>
+          <p:cNvPr id="16" name="Oval 15">
+            <a:extLst>
+              <a:ext uri="{FF2B5EF4-FFF2-40B4-BE49-F238E27FC236}">
+                <a16:creationId xmlns:a16="http://schemas.microsoft.com/office/drawing/2014/main" id="{4189F8B2-2570-4F79-B057-12AD1EDD9209}"/>
+              </a:ext>
+            </a:extLst>
+          </p:cNvPr>
+          <p:cNvSpPr/>
+          <p:nvPr/>
+        </p:nvSpPr>
+        <p:spPr>
+          <a:xfrm>
+            <a:off x="4549817" y="758379"/>
+            <a:ext cx="489097" cy="489097"/>
+          </a:xfrm>
+          <a:prstGeom prst="ellipse">
+            <a:avLst/>
+          </a:prstGeom>
+        </p:spPr>
+        <p:style>
+          <a:lnRef idx="2">
+            <a:schemeClr val="dk1">
+              <a:shade val="15000"/>
+            </a:schemeClr>
+          </a:lnRef>
+          <a:fillRef idx="1">
+            <a:schemeClr val="dk1"/>
+          </a:fillRef>
+          <a:effectRef idx="0">
+            <a:schemeClr val="dk1"/>
+          </a:effectRef>
+          <a:fontRef idx="minor">
+            <a:schemeClr val="lt1"/>
+          </a:fontRef>
+        </p:style>
+        <p:txBody>
+          <a:bodyPr rtlCol="0" anchor="ctr"/>
+          <a:lstStyle/>
+          <a:p>
+            <a:pPr algn="ctr"/>
+            <a:endParaRPr lang="en-US"/>
+          </a:p>
+        </p:txBody>
+      </p:sp>
+      <p:sp>
+        <p:nvSpPr>
+          <p:cNvPr id="17" name="Oval 16">
+            <a:extLst>
+              <a:ext uri="{FF2B5EF4-FFF2-40B4-BE49-F238E27FC236}">
+                <a16:creationId xmlns:a16="http://schemas.microsoft.com/office/drawing/2014/main" id="{756304FF-D597-8211-2D82-307C4F0BA60F}"/>
+              </a:ext>
+            </a:extLst>
+          </p:cNvPr>
+          <p:cNvSpPr/>
+          <p:nvPr/>
+        </p:nvSpPr>
+        <p:spPr>
+          <a:xfrm>
+            <a:off x="4549817" y="1787894"/>
+            <a:ext cx="489097" cy="489097"/>
+          </a:xfrm>
+          <a:prstGeom prst="ellipse">
+            <a:avLst/>
+          </a:prstGeom>
+        </p:spPr>
+        <p:style>
+          <a:lnRef idx="2">
+            <a:schemeClr val="dk1">
+              <a:shade val="15000"/>
+            </a:schemeClr>
+          </a:lnRef>
+          <a:fillRef idx="1">
+            <a:schemeClr val="dk1"/>
+          </a:fillRef>
+          <a:effectRef idx="0">
+            <a:schemeClr val="dk1"/>
+          </a:effectRef>
+          <a:fontRef idx="minor">
+            <a:schemeClr val="lt1"/>
+          </a:fontRef>
+        </p:style>
+        <p:txBody>
+          <a:bodyPr rtlCol="0" anchor="ctr"/>
+          <a:lstStyle/>
+          <a:p>
+            <a:pPr algn="ctr"/>
+            <a:endParaRPr lang="en-US"/>
+          </a:p>
+        </p:txBody>
+      </p:sp>
+      <p:sp>
+        <p:nvSpPr>
+          <p:cNvPr id="18" name="Oval 17">
+            <a:extLst>
+              <a:ext uri="{FF2B5EF4-FFF2-40B4-BE49-F238E27FC236}">
+                <a16:creationId xmlns:a16="http://schemas.microsoft.com/office/drawing/2014/main" id="{0ABA0D9B-6E5F-468B-C28E-AF5538E14486}"/>
+              </a:ext>
+            </a:extLst>
+          </p:cNvPr>
+          <p:cNvSpPr/>
+          <p:nvPr/>
+        </p:nvSpPr>
+        <p:spPr>
+          <a:xfrm>
+            <a:off x="4026490" y="2939903"/>
+            <a:ext cx="489097" cy="489097"/>
+          </a:xfrm>
+          <a:prstGeom prst="ellipse">
+            <a:avLst/>
+          </a:prstGeom>
+        </p:spPr>
+        <p:style>
+          <a:lnRef idx="2">
+            <a:schemeClr val="dk1">
+              <a:shade val="15000"/>
+            </a:schemeClr>
+          </a:lnRef>
+          <a:fillRef idx="1">
+            <a:schemeClr val="dk1"/>
+          </a:fillRef>
+          <a:effectRef idx="0">
+            <a:schemeClr val="dk1"/>
+          </a:effectRef>
+          <a:fontRef idx="minor">
+            <a:schemeClr val="lt1"/>
+          </a:fontRef>
+        </p:style>
+        <p:txBody>
+          <a:bodyPr rtlCol="0" anchor="ctr"/>
+          <a:lstStyle/>
+          <a:p>
+            <a:pPr algn="ctr"/>
+            <a:endParaRPr lang="en-US"/>
+          </a:p>
+        </p:txBody>
+      </p:sp>
+      <p:sp>
+        <p:nvSpPr>
+          <p:cNvPr id="19" name="Oval 18">
+            <a:extLst>
+              <a:ext uri="{FF2B5EF4-FFF2-40B4-BE49-F238E27FC236}">
+                <a16:creationId xmlns:a16="http://schemas.microsoft.com/office/drawing/2014/main" id="{74E997F5-3F88-891C-9190-5742CF02FFA5}"/>
+              </a:ext>
+            </a:extLst>
+          </p:cNvPr>
+          <p:cNvSpPr/>
+          <p:nvPr/>
+        </p:nvSpPr>
+        <p:spPr>
+          <a:xfrm>
+            <a:off x="5292650" y="3785431"/>
+            <a:ext cx="489097" cy="489097"/>
+          </a:xfrm>
+          <a:prstGeom prst="ellipse">
+            <a:avLst/>
+          </a:prstGeom>
+        </p:spPr>
+        <p:style>
+          <a:lnRef idx="2">
+            <a:schemeClr val="dk1">
+              <a:shade val="15000"/>
+            </a:schemeClr>
+          </a:lnRef>
+          <a:fillRef idx="1">
+            <a:schemeClr val="dk1"/>
+          </a:fillRef>
+          <a:effectRef idx="0">
+            <a:schemeClr val="dk1"/>
+          </a:effectRef>
+          <a:fontRef idx="minor">
+            <a:schemeClr val="lt1"/>
+          </a:fontRef>
+        </p:style>
+        <p:txBody>
+          <a:bodyPr rtlCol="0" anchor="ctr"/>
+          <a:lstStyle/>
+          <a:p>
+            <a:pPr algn="ctr"/>
+            <a:endParaRPr lang="en-US"/>
+          </a:p>
+        </p:txBody>
+      </p:sp>
+      <p:sp>
+        <p:nvSpPr>
+          <p:cNvPr id="20" name="Oval 19">
+            <a:extLst>
+              <a:ext uri="{FF2B5EF4-FFF2-40B4-BE49-F238E27FC236}">
+                <a16:creationId xmlns:a16="http://schemas.microsoft.com/office/drawing/2014/main" id="{DA094F58-AF8D-999C-FCF2-EEDFAA3DC41C}"/>
+              </a:ext>
+            </a:extLst>
+          </p:cNvPr>
+          <p:cNvSpPr/>
+          <p:nvPr/>
+        </p:nvSpPr>
+        <p:spPr>
+          <a:xfrm>
+            <a:off x="5826609" y="2658004"/>
+            <a:ext cx="489097" cy="489097"/>
+          </a:xfrm>
+          <a:prstGeom prst="ellipse">
+            <a:avLst/>
+          </a:prstGeom>
+        </p:spPr>
+        <p:style>
+          <a:lnRef idx="2">
+            <a:schemeClr val="dk1">
+              <a:shade val="15000"/>
+            </a:schemeClr>
+          </a:lnRef>
+          <a:fillRef idx="1">
+            <a:schemeClr val="dk1"/>
+          </a:fillRef>
+          <a:effectRef idx="0">
+            <a:schemeClr val="dk1"/>
+          </a:effectRef>
+          <a:fontRef idx="minor">
+            <a:schemeClr val="lt1"/>
+          </a:fontRef>
+        </p:style>
+        <p:txBody>
+          <a:bodyPr rtlCol="0" anchor="ctr"/>
+          <a:lstStyle/>
+          <a:p>
+            <a:pPr algn="ctr"/>
+            <a:endParaRPr lang="en-US"/>
+          </a:p>
+        </p:txBody>
+      </p:sp>
+      <p:sp>
+        <p:nvSpPr>
+          <p:cNvPr id="21" name="Oval 20">
+            <a:extLst>
+              <a:ext uri="{FF2B5EF4-FFF2-40B4-BE49-F238E27FC236}">
+                <a16:creationId xmlns:a16="http://schemas.microsoft.com/office/drawing/2014/main" id="{EAE32FB6-4C42-8756-E68E-AB493B985355}"/>
+              </a:ext>
+            </a:extLst>
+          </p:cNvPr>
+          <p:cNvSpPr/>
+          <p:nvPr/>
+        </p:nvSpPr>
+        <p:spPr>
+          <a:xfrm>
+            <a:off x="5826609" y="869711"/>
+            <a:ext cx="489097" cy="489097"/>
+          </a:xfrm>
+          <a:prstGeom prst="ellipse">
+            <a:avLst/>
+          </a:prstGeom>
+        </p:spPr>
+        <p:style>
+          <a:lnRef idx="2">
+            <a:schemeClr val="dk1">
+              <a:shade val="15000"/>
+            </a:schemeClr>
+          </a:lnRef>
+          <a:fillRef idx="1">
+            <a:schemeClr val="dk1"/>
+          </a:fillRef>
+          <a:effectRef idx="0">
+            <a:schemeClr val="dk1"/>
+          </a:effectRef>
+          <a:fontRef idx="minor">
+            <a:schemeClr val="lt1"/>
+          </a:fontRef>
+        </p:style>
+        <p:txBody>
+          <a:bodyPr rtlCol="0" anchor="ctr"/>
+          <a:lstStyle/>
+          <a:p>
+            <a:pPr algn="ctr"/>
+            <a:endParaRPr lang="en-US"/>
+          </a:p>
+        </p:txBody>
+      </p:sp>
+      <p:sp>
+        <p:nvSpPr>
+          <p:cNvPr id="22" name="Oval 21">
+            <a:extLst>
+              <a:ext uri="{FF2B5EF4-FFF2-40B4-BE49-F238E27FC236}">
+                <a16:creationId xmlns:a16="http://schemas.microsoft.com/office/drawing/2014/main" id="{CE3F52C5-5BE2-BB0A-4CCB-2BAE43089049}"/>
+              </a:ext>
+            </a:extLst>
+          </p:cNvPr>
+          <p:cNvSpPr/>
+          <p:nvPr/>
+        </p:nvSpPr>
+        <p:spPr>
+          <a:xfrm>
+            <a:off x="7409225" y="2881436"/>
+            <a:ext cx="489097" cy="489097"/>
+          </a:xfrm>
+          <a:prstGeom prst="ellipse">
+            <a:avLst/>
+          </a:prstGeom>
+        </p:spPr>
+        <p:style>
+          <a:lnRef idx="2">
+            <a:schemeClr val="dk1">
+              <a:shade val="15000"/>
+            </a:schemeClr>
+          </a:lnRef>
+          <a:fillRef idx="1">
+            <a:schemeClr val="dk1"/>
+          </a:fillRef>
+          <a:effectRef idx="0">
+            <a:schemeClr val="dk1"/>
+          </a:effectRef>
+          <a:fontRef idx="minor">
+            <a:schemeClr val="lt1"/>
+          </a:fontRef>
+        </p:style>
+        <p:txBody>
+          <a:bodyPr rtlCol="0" anchor="ctr"/>
+          <a:lstStyle/>
+          <a:p>
+            <a:pPr algn="ctr"/>
+            <a:endParaRPr lang="en-US"/>
+          </a:p>
+        </p:txBody>
+      </p:sp>
+      <p:sp>
+        <p:nvSpPr>
+          <p:cNvPr id="23" name="Oval 22">
+            <a:extLst>
+              <a:ext uri="{FF2B5EF4-FFF2-40B4-BE49-F238E27FC236}">
+                <a16:creationId xmlns:a16="http://schemas.microsoft.com/office/drawing/2014/main" id="{1E777F77-E2F9-21CE-EDAE-788FB5A50D31}"/>
+              </a:ext>
+            </a:extLst>
+          </p:cNvPr>
+          <p:cNvSpPr/>
+          <p:nvPr/>
+        </p:nvSpPr>
+        <p:spPr>
+          <a:xfrm>
+            <a:off x="6817516" y="3785430"/>
+            <a:ext cx="489097" cy="489097"/>
+          </a:xfrm>
+          <a:prstGeom prst="ellipse">
+            <a:avLst/>
+          </a:prstGeom>
+        </p:spPr>
+        <p:style>
+          <a:lnRef idx="2">
+            <a:schemeClr val="dk1">
+              <a:shade val="15000"/>
+            </a:schemeClr>
+          </a:lnRef>
+          <a:fillRef idx="1">
+            <a:schemeClr val="dk1"/>
+          </a:fillRef>
+          <a:effectRef idx="0">
+            <a:schemeClr val="dk1"/>
+          </a:effectRef>
+          <a:fontRef idx="minor">
+            <a:schemeClr val="lt1"/>
+          </a:fontRef>
+        </p:style>
+        <p:txBody>
+          <a:bodyPr rtlCol="0" anchor="ctr"/>
+          <a:lstStyle/>
+          <a:p>
+            <a:pPr algn="ctr"/>
+            <a:endParaRPr lang="en-US"/>
+          </a:p>
+        </p:txBody>
+      </p:sp>
+      <p:sp>
+        <p:nvSpPr>
+          <p:cNvPr id="24" name="Oval 23">
+            <a:extLst>
+              <a:ext uri="{FF2B5EF4-FFF2-40B4-BE49-F238E27FC236}">
+                <a16:creationId xmlns:a16="http://schemas.microsoft.com/office/drawing/2014/main" id="{4978FB8E-2B9D-6486-B44C-42A2A1FBE5E5}"/>
+              </a:ext>
+            </a:extLst>
+          </p:cNvPr>
+          <p:cNvSpPr/>
+          <p:nvPr/>
+        </p:nvSpPr>
+        <p:spPr>
+          <a:xfrm>
+            <a:off x="7077158" y="1718556"/>
+            <a:ext cx="489097" cy="489097"/>
+          </a:xfrm>
+          <a:prstGeom prst="ellipse">
+            <a:avLst/>
+          </a:prstGeom>
+        </p:spPr>
+        <p:style>
+          <a:lnRef idx="2">
+            <a:schemeClr val="dk1">
+              <a:shade val="15000"/>
+            </a:schemeClr>
+          </a:lnRef>
+          <a:fillRef idx="1">
+            <a:schemeClr val="dk1"/>
+          </a:fillRef>
+          <a:effectRef idx="0">
+            <a:schemeClr val="dk1"/>
+          </a:effectRef>
+          <a:fontRef idx="minor">
+            <a:schemeClr val="lt1"/>
+          </a:fontRef>
+        </p:style>
+        <p:txBody>
+          <a:bodyPr rtlCol="0" anchor="ctr"/>
+          <a:lstStyle/>
+          <a:p>
+            <a:pPr algn="ctr"/>
+            <a:endParaRPr lang="en-US"/>
+          </a:p>
+        </p:txBody>
+      </p:sp>
+    </p:spTree>
+    <p:extLst>
+      <p:ext uri="{BB962C8B-B14F-4D97-AF65-F5344CB8AC3E}">
+        <p14:creationId xmlns:p14="http://schemas.microsoft.com/office/powerpoint/2010/main" val="2996979462"/>
+      </p:ext>
+    </p:extLst>
+  </p:cSld>
+  <p:clrMapOvr>
+    <a:masterClrMapping/>
+  </p:clrMapOvr>
+</p:sld>
+</file>
+
+<file path=ppt/slides/slide3.xml><?xml version="1.0" encoding="utf-8"?>
+<p:sld xmlns:a="http://schemas.openxmlformats.org/drawingml/2006/main" xmlns:r="http://schemas.openxmlformats.org/officeDocument/2006/relationships" xmlns:p="http://schemas.openxmlformats.org/presentationml/2006/main">
+  <p:cSld>
+    <p:spTree>
+      <p:nvGrpSpPr>
+        <p:cNvPr id="1" name="">
+          <a:extLst>
+            <a:ext uri="{FF2B5EF4-FFF2-40B4-BE49-F238E27FC236}">
+              <a16:creationId xmlns:a16="http://schemas.microsoft.com/office/drawing/2014/main" id="{E653E0E8-FC6A-9CC7-61D9-4DA3293CB5D4}"/>
+            </a:ext>
+          </a:extLst>
+        </p:cNvPr>
+        <p:cNvGrpSpPr/>
+        <p:nvPr/>
+      </p:nvGrpSpPr>
+      <p:grpSpPr>
+        <a:xfrm>
+          <a:off x="0" y="0"/>
+          <a:ext cx="0" cy="0"/>
+          <a:chOff x="0" y="0"/>
+          <a:chExt cx="0" cy="0"/>
+        </a:xfrm>
+      </p:grpSpPr>
+      <p:pic>
+        <p:nvPicPr>
+          <p:cNvPr id="6" name="Picture 5" descr="A game of a board game&#10;&#10;AI-generated content may be incorrect.">
+            <a:extLst>
+              <a:ext uri="{FF2B5EF4-FFF2-40B4-BE49-F238E27FC236}">
+                <a16:creationId xmlns:a16="http://schemas.microsoft.com/office/drawing/2014/main" id="{120C1AAB-8D5B-C123-6F3F-C487033D4442}"/>
+              </a:ext>
+            </a:extLst>
+          </p:cNvPr>
+          <p:cNvPicPr>
+            <a:picLocks noChangeAspect="1"/>
+          </p:cNvPicPr>
+          <p:nvPr/>
+        </p:nvPicPr>
+        <p:blipFill>
+          <a:blip r:embed="rId2"/>
+          <a:stretch>
+            <a:fillRect/>
+          </a:stretch>
+        </p:blipFill>
+        <p:spPr>
+          <a:xfrm>
+            <a:off x="1" y="0"/>
+            <a:ext cx="8964707" cy="6858000"/>
+          </a:xfrm>
+          <a:prstGeom prst="rect">
+            <a:avLst/>
+          </a:prstGeom>
+        </p:spPr>
+      </p:pic>
+      <p:sp>
+        <p:nvSpPr>
+          <p:cNvPr id="7" name="Rectangle 6">
+            <a:extLst>
+              <a:ext uri="{FF2B5EF4-FFF2-40B4-BE49-F238E27FC236}">
+                <a16:creationId xmlns:a16="http://schemas.microsoft.com/office/drawing/2014/main" id="{2658EAA0-BAA3-F8EA-BD12-CDA096B930EB}"/>
+              </a:ext>
+            </a:extLst>
+          </p:cNvPr>
+          <p:cNvSpPr/>
+          <p:nvPr/>
+        </p:nvSpPr>
+        <p:spPr>
+          <a:xfrm rot="1979634">
+            <a:off x="-131765" y="3372644"/>
+            <a:ext cx="6582822" cy="2574389"/>
+          </a:xfrm>
+          <a:prstGeom prst="rect">
+            <a:avLst/>
+          </a:prstGeom>
+          <a:solidFill>
+            <a:schemeClr val="accent1">
+              <a:alpha val="20000"/>
+            </a:schemeClr>
+          </a:solidFill>
+          <a:ln>
+            <a:noFill/>
+          </a:ln>
+        </p:spPr>
+        <p:style>
+          <a:lnRef idx="2">
+            <a:schemeClr val="accent1">
+              <a:shade val="15000"/>
+            </a:schemeClr>
+          </a:lnRef>
+          <a:fillRef idx="1">
+            <a:schemeClr val="accent1"/>
+          </a:fillRef>
+          <a:effectRef idx="0">
+            <a:schemeClr val="accent1"/>
+          </a:effectRef>
+          <a:fontRef idx="minor">
+            <a:schemeClr val="lt1"/>
+          </a:fontRef>
+        </p:style>
+        <p:txBody>
+          <a:bodyPr rtlCol="0" anchor="ctr"/>
+          <a:lstStyle/>
+          <a:p>
+            <a:pPr algn="ctr"/>
+            <a:endParaRPr lang="en-US"/>
+          </a:p>
+        </p:txBody>
+      </p:sp>
+      <p:sp>
+        <p:nvSpPr>
+          <p:cNvPr id="8" name="Rectangle 7">
+            <a:extLst>
+              <a:ext uri="{FF2B5EF4-FFF2-40B4-BE49-F238E27FC236}">
+                <a16:creationId xmlns:a16="http://schemas.microsoft.com/office/drawing/2014/main" id="{D3956B01-D09C-C842-5D76-2182C5EBBDA5}"/>
+              </a:ext>
+            </a:extLst>
+          </p:cNvPr>
+          <p:cNvSpPr/>
+          <p:nvPr/>
+        </p:nvSpPr>
+        <p:spPr>
+          <a:xfrm rot="1979634">
+            <a:off x="1896508" y="385411"/>
+            <a:ext cx="6558877" cy="2337741"/>
+          </a:xfrm>
+          <a:prstGeom prst="rect">
+            <a:avLst/>
+          </a:prstGeom>
+          <a:solidFill>
+            <a:schemeClr val="accent5">
+              <a:alpha val="20000"/>
+            </a:schemeClr>
+          </a:solidFill>
+          <a:ln>
+            <a:noFill/>
+          </a:ln>
+        </p:spPr>
+        <p:style>
+          <a:lnRef idx="2">
+            <a:schemeClr val="accent1">
+              <a:shade val="15000"/>
+            </a:schemeClr>
+          </a:lnRef>
+          <a:fillRef idx="1">
+            <a:schemeClr val="accent1"/>
+          </a:fillRef>
+          <a:effectRef idx="0">
+            <a:schemeClr val="accent1"/>
+          </a:effectRef>
+          <a:fontRef idx="minor">
+            <a:schemeClr val="lt1"/>
+          </a:fontRef>
+        </p:style>
+        <p:txBody>
+          <a:bodyPr rtlCol="0" anchor="ctr"/>
+          <a:lstStyle/>
+          <a:p>
+            <a:pPr algn="ctr"/>
+            <a:endParaRPr lang="en-US"/>
+          </a:p>
+        </p:txBody>
+      </p:sp>
+      <p:sp>
+        <p:nvSpPr>
+          <p:cNvPr id="9" name="Rectangle 8">
+            <a:extLst>
+              <a:ext uri="{FF2B5EF4-FFF2-40B4-BE49-F238E27FC236}">
+                <a16:creationId xmlns:a16="http://schemas.microsoft.com/office/drawing/2014/main" id="{550BF425-5DA2-E946-8EB7-DC5ECACD4ADE}"/>
+              </a:ext>
+            </a:extLst>
+          </p:cNvPr>
+          <p:cNvSpPr/>
+          <p:nvPr/>
+        </p:nvSpPr>
+        <p:spPr>
+          <a:xfrm rot="1979634">
+            <a:off x="901795" y="2449619"/>
+            <a:ext cx="6568256" cy="1204578"/>
+          </a:xfrm>
+          <a:prstGeom prst="rect">
+            <a:avLst/>
+          </a:prstGeom>
+          <a:solidFill>
+            <a:schemeClr val="accent2">
+              <a:alpha val="20000"/>
+            </a:schemeClr>
+          </a:solidFill>
+          <a:ln>
+            <a:noFill/>
+          </a:ln>
+        </p:spPr>
+        <p:style>
+          <a:lnRef idx="2">
+            <a:schemeClr val="accent1">
+              <a:shade val="15000"/>
+            </a:schemeClr>
+          </a:lnRef>
+          <a:fillRef idx="1">
+            <a:schemeClr val="accent1"/>
+          </a:fillRef>
+          <a:effectRef idx="0">
+            <a:schemeClr val="accent1"/>
+          </a:effectRef>
+          <a:fontRef idx="minor">
+            <a:schemeClr val="lt1"/>
+          </a:fontRef>
+        </p:style>
+        <p:txBody>
+          <a:bodyPr rtlCol="0" anchor="ctr"/>
+          <a:lstStyle/>
+          <a:p>
+            <a:pPr algn="ctr"/>
+            <a:endParaRPr lang="en-US"/>
+          </a:p>
+        </p:txBody>
+      </p:sp>
       <p:graphicFrame>
         <p:nvGraphicFramePr>
           <p:cNvPr id="2" name="Table 1">
             <a:extLst>
               <a:ext uri="{FF2B5EF4-FFF2-40B4-BE49-F238E27FC236}">
-                <a16:creationId xmlns:a16="http://schemas.microsoft.com/office/drawing/2014/main" id="{D8406CB1-E7A7-22FB-9E46-2F778657F5C8}"/>
+                <a16:creationId xmlns:a16="http://schemas.microsoft.com/office/drawing/2014/main" id="{64176D2B-264F-ECD1-E7EB-0D20F8114834}"/>
               </a:ext>
             </a:extLst>
           </p:cNvPr>
           <p:cNvGraphicFramePr>
             <a:graphicFrameLocks noGrp="1"/>
           </p:cNvGraphicFramePr>
-          <p:nvPr>
-            <p:extLst>
-              <p:ext uri="{D42A27DB-BD31-4B8C-83A1-F6EECF244321}">
-                <p14:modId xmlns:p14="http://schemas.microsoft.com/office/powerpoint/2010/main" val="2339453393"/>
-              </p:ext>
-            </p:extLst>
-          </p:nvPr>
+          <p:nvPr/>
         </p:nvGraphicFramePr>
         <p:xfrm>
           <a:off x="-1" y="0"/>
@@ -12501,7 +14263,7 @@
     </p:spTree>
     <p:extLst>
       <p:ext uri="{BB962C8B-B14F-4D97-AF65-F5344CB8AC3E}">
-        <p14:creationId xmlns:p14="http://schemas.microsoft.com/office/powerpoint/2010/main" val="2075628722"/>
+        <p14:creationId xmlns:p14="http://schemas.microsoft.com/office/powerpoint/2010/main" val="3700667524"/>
       </p:ext>
     </p:extLst>
   </p:cSld>
@@ -12824,4 +14586,319 @@
     </a:ext>
   </a:extLst>
 </a:theme>
+</file>
+
+<file path=ppt/theme/theme2.xml><?xml version="1.0" encoding="utf-8"?>
+<a:theme xmlns:a="http://schemas.openxmlformats.org/drawingml/2006/main" name="Office Theme">
+  <a:themeElements>
+    <a:clrScheme name="Office">
+      <a:dk1>
+        <a:sysClr val="windowText" lastClr="000000"/>
+      </a:dk1>
+      <a:lt1>
+        <a:sysClr val="window" lastClr="FFFFFF"/>
+      </a:lt1>
+      <a:dk2>
+        <a:srgbClr val="0E2841"/>
+      </a:dk2>
+      <a:lt2>
+        <a:srgbClr val="E8E8E8"/>
+      </a:lt2>
+      <a:accent1>
+        <a:srgbClr val="156082"/>
+      </a:accent1>
+      <a:accent2>
+        <a:srgbClr val="E97132"/>
+      </a:accent2>
+      <a:accent3>
+        <a:srgbClr val="196B24"/>
+      </a:accent3>
+      <a:accent4>
+        <a:srgbClr val="0F9ED5"/>
+      </a:accent4>
+      <a:accent5>
+        <a:srgbClr val="A02B93"/>
+      </a:accent5>
+      <a:accent6>
+        <a:srgbClr val="4EA72E"/>
+      </a:accent6>
+      <a:hlink>
+        <a:srgbClr val="467886"/>
+      </a:hlink>
+      <a:folHlink>
+        <a:srgbClr val="96607D"/>
+      </a:folHlink>
+    </a:clrScheme>
+    <a:fontScheme name="Office">
+      <a:majorFont>
+        <a:latin typeface="Aptos Display" panose="02110004020202020204"/>
+        <a:ea typeface=""/>
+        <a:cs typeface=""/>
+        <a:font script="Jpan" typeface="游ゴシック Light"/>
+        <a:font script="Hang" typeface="맑은 고딕"/>
+        <a:font script="Hans" typeface="等线 Light"/>
+        <a:font script="Hant" typeface="新細明體"/>
+        <a:font script="Arab" typeface="Times New Roman"/>
+        <a:font script="Hebr" typeface="Times New Roman"/>
+        <a:font script="Thai" typeface="Angsana New"/>
+        <a:font script="Ethi" typeface="Nyala"/>
+        <a:font script="Beng" typeface="Vrinda"/>
+        <a:font script="Gujr" typeface="Shruti"/>
+        <a:font script="Khmr" typeface="MoolBoran"/>
+        <a:font script="Knda" typeface="Tunga"/>
+        <a:font script="Guru" typeface="Raavi"/>
+        <a:font script="Cans" typeface="Euphemia"/>
+        <a:font script="Cher" typeface="Plantagenet Cherokee"/>
+        <a:font script="Yiii" typeface="Microsoft Yi Baiti"/>
+        <a:font script="Tibt" typeface="Microsoft Himalaya"/>
+        <a:font script="Thaa" typeface="MV Boli"/>
+        <a:font script="Deva" typeface="Mangal"/>
+        <a:font script="Telu" typeface="Gautami"/>
+        <a:font script="Taml" typeface="Latha"/>
+        <a:font script="Syrc" typeface="Estrangelo Edessa"/>
+        <a:font script="Orya" typeface="Kalinga"/>
+        <a:font script="Mlym" typeface="Kartika"/>
+        <a:font script="Laoo" typeface="DokChampa"/>
+        <a:font script="Sinh" typeface="Iskoola Pota"/>
+        <a:font script="Mong" typeface="Mongolian Baiti"/>
+        <a:font script="Viet" typeface="Times New Roman"/>
+        <a:font script="Uigh" typeface="Microsoft Uighur"/>
+        <a:font script="Geor" typeface="Sylfaen"/>
+        <a:font script="Armn" typeface="Arial"/>
+        <a:font script="Bugi" typeface="Leelawadee UI"/>
+        <a:font script="Bopo" typeface="Microsoft JhengHei"/>
+        <a:font script="Java" typeface="Javanese Text"/>
+        <a:font script="Lisu" typeface="Segoe UI"/>
+        <a:font script="Mymr" typeface="Myanmar Text"/>
+        <a:font script="Nkoo" typeface="Ebrima"/>
+        <a:font script="Olck" typeface="Nirmala UI"/>
+        <a:font script="Osma" typeface="Ebrima"/>
+        <a:font script="Phag" typeface="Phagspa"/>
+        <a:font script="Syrn" typeface="Estrangelo Edessa"/>
+        <a:font script="Syrj" typeface="Estrangelo Edessa"/>
+        <a:font script="Syre" typeface="Estrangelo Edessa"/>
+        <a:font script="Sora" typeface="Nirmala UI"/>
+        <a:font script="Tale" typeface="Microsoft Tai Le"/>
+        <a:font script="Talu" typeface="Microsoft New Tai Lue"/>
+        <a:font script="Tfng" typeface="Ebrima"/>
+      </a:majorFont>
+      <a:minorFont>
+        <a:latin typeface="Aptos" panose="02110004020202020204"/>
+        <a:ea typeface=""/>
+        <a:cs typeface=""/>
+        <a:font script="Jpan" typeface="游ゴシック"/>
+        <a:font script="Hang" typeface="맑은 고딕"/>
+        <a:font script="Hans" typeface="等线"/>
+        <a:font script="Hant" typeface="新細明體"/>
+        <a:font script="Arab" typeface="Arial"/>
+        <a:font script="Hebr" typeface="Arial"/>
+        <a:font script="Thai" typeface="Cordia New"/>
+        <a:font script="Ethi" typeface="Nyala"/>
+        <a:font script="Beng" typeface="Vrinda"/>
+        <a:font script="Gujr" typeface="Shruti"/>
+        <a:font script="Khmr" typeface="DaunPenh"/>
+        <a:font script="Knda" typeface="Tunga"/>
+        <a:font script="Guru" typeface="Raavi"/>
+        <a:font script="Cans" typeface="Euphemia"/>
+        <a:font script="Cher" typeface="Plantagenet Cherokee"/>
+        <a:font script="Yiii" typeface="Microsoft Yi Baiti"/>
+        <a:font script="Tibt" typeface="Microsoft Himalaya"/>
+        <a:font script="Thaa" typeface="MV Boli"/>
+        <a:font script="Deva" typeface="Mangal"/>
+        <a:font script="Telu" typeface="Gautami"/>
+        <a:font script="Taml" typeface="Latha"/>
+        <a:font script="Syrc" typeface="Estrangelo Edessa"/>
+        <a:font script="Orya" typeface="Kalinga"/>
+        <a:font script="Mlym" typeface="Kartika"/>
+        <a:font script="Laoo" typeface="DokChampa"/>
+        <a:font script="Sinh" typeface="Iskoola Pota"/>
+        <a:font script="Mong" typeface="Mongolian Baiti"/>
+        <a:font script="Viet" typeface="Arial"/>
+        <a:font script="Uigh" typeface="Microsoft Uighur"/>
+        <a:font script="Geor" typeface="Sylfaen"/>
+        <a:font script="Armn" typeface="Arial"/>
+        <a:font script="Bugi" typeface="Leelawadee UI"/>
+        <a:font script="Bopo" typeface="Microsoft JhengHei"/>
+        <a:font script="Java" typeface="Javanese Text"/>
+        <a:font script="Lisu" typeface="Segoe UI"/>
+        <a:font script="Mymr" typeface="Myanmar Text"/>
+        <a:font script="Nkoo" typeface="Ebrima"/>
+        <a:font script="Olck" typeface="Nirmala UI"/>
+        <a:font script="Osma" typeface="Ebrima"/>
+        <a:font script="Phag" typeface="Phagspa"/>
+        <a:font script="Syrn" typeface="Estrangelo Edessa"/>
+        <a:font script="Syrj" typeface="Estrangelo Edessa"/>
+        <a:font script="Syre" typeface="Estrangelo Edessa"/>
+        <a:font script="Sora" typeface="Nirmala UI"/>
+        <a:font script="Tale" typeface="Microsoft Tai Le"/>
+        <a:font script="Talu" typeface="Microsoft New Tai Lue"/>
+        <a:font script="Tfng" typeface="Ebrima"/>
+      </a:minorFont>
+    </a:fontScheme>
+    <a:fmtScheme name="Office">
+      <a:fillStyleLst>
+        <a:solidFill>
+          <a:schemeClr val="phClr"/>
+        </a:solidFill>
+        <a:gradFill rotWithShape="1">
+          <a:gsLst>
+            <a:gs pos="0">
+              <a:schemeClr val="phClr">
+                <a:lumMod val="110000"/>
+                <a:satMod val="105000"/>
+                <a:tint val="67000"/>
+              </a:schemeClr>
+            </a:gs>
+            <a:gs pos="50000">
+              <a:schemeClr val="phClr">
+                <a:lumMod val="105000"/>
+                <a:satMod val="103000"/>
+                <a:tint val="73000"/>
+              </a:schemeClr>
+            </a:gs>
+            <a:gs pos="100000">
+              <a:schemeClr val="phClr">
+                <a:lumMod val="105000"/>
+                <a:satMod val="109000"/>
+                <a:tint val="81000"/>
+              </a:schemeClr>
+            </a:gs>
+          </a:gsLst>
+          <a:lin ang="5400000" scaled="0"/>
+        </a:gradFill>
+        <a:gradFill rotWithShape="1">
+          <a:gsLst>
+            <a:gs pos="0">
+              <a:schemeClr val="phClr">
+                <a:satMod val="103000"/>
+                <a:lumMod val="102000"/>
+                <a:tint val="94000"/>
+              </a:schemeClr>
+            </a:gs>
+            <a:gs pos="50000">
+              <a:schemeClr val="phClr">
+                <a:satMod val="110000"/>
+                <a:lumMod val="100000"/>
+                <a:shade val="100000"/>
+              </a:schemeClr>
+            </a:gs>
+            <a:gs pos="100000">
+              <a:schemeClr val="phClr">
+                <a:lumMod val="99000"/>
+                <a:satMod val="120000"/>
+                <a:shade val="78000"/>
+              </a:schemeClr>
+            </a:gs>
+          </a:gsLst>
+          <a:lin ang="5400000" scaled="0"/>
+        </a:gradFill>
+      </a:fillStyleLst>
+      <a:lnStyleLst>
+        <a:ln w="12700" cap="flat" cmpd="sng" algn="ctr">
+          <a:solidFill>
+            <a:schemeClr val="phClr"/>
+          </a:solidFill>
+          <a:prstDash val="solid"/>
+          <a:miter lim="800000"/>
+        </a:ln>
+        <a:ln w="19050" cap="flat" cmpd="sng" algn="ctr">
+          <a:solidFill>
+            <a:schemeClr val="phClr"/>
+          </a:solidFill>
+          <a:prstDash val="solid"/>
+          <a:miter lim="800000"/>
+        </a:ln>
+        <a:ln w="25400" cap="flat" cmpd="sng" algn="ctr">
+          <a:solidFill>
+            <a:schemeClr val="phClr"/>
+          </a:solidFill>
+          <a:prstDash val="solid"/>
+          <a:miter lim="800000"/>
+        </a:ln>
+      </a:lnStyleLst>
+      <a:effectStyleLst>
+        <a:effectStyle>
+          <a:effectLst/>
+        </a:effectStyle>
+        <a:effectStyle>
+          <a:effectLst/>
+        </a:effectStyle>
+        <a:effectStyle>
+          <a:effectLst>
+            <a:outerShdw blurRad="57150" dist="19050" dir="5400000" algn="ctr" rotWithShape="0">
+              <a:srgbClr val="000000">
+                <a:alpha val="63000"/>
+              </a:srgbClr>
+            </a:outerShdw>
+          </a:effectLst>
+        </a:effectStyle>
+      </a:effectStyleLst>
+      <a:bgFillStyleLst>
+        <a:solidFill>
+          <a:schemeClr val="phClr"/>
+        </a:solidFill>
+        <a:solidFill>
+          <a:schemeClr val="phClr">
+            <a:tint val="95000"/>
+            <a:satMod val="170000"/>
+          </a:schemeClr>
+        </a:solidFill>
+        <a:gradFill rotWithShape="1">
+          <a:gsLst>
+            <a:gs pos="0">
+              <a:schemeClr val="phClr">
+                <a:tint val="93000"/>
+                <a:satMod val="150000"/>
+                <a:shade val="98000"/>
+                <a:lumMod val="102000"/>
+              </a:schemeClr>
+            </a:gs>
+            <a:gs pos="50000">
+              <a:schemeClr val="phClr">
+                <a:tint val="98000"/>
+                <a:satMod val="130000"/>
+                <a:shade val="90000"/>
+                <a:lumMod val="103000"/>
+              </a:schemeClr>
+            </a:gs>
+            <a:gs pos="100000">
+              <a:schemeClr val="phClr">
+                <a:shade val="63000"/>
+                <a:satMod val="120000"/>
+              </a:schemeClr>
+            </a:gs>
+          </a:gsLst>
+          <a:lin ang="5400000" scaled="0"/>
+        </a:gradFill>
+      </a:bgFillStyleLst>
+    </a:fmtScheme>
+  </a:themeElements>
+  <a:objectDefaults>
+    <a:lnDef>
+      <a:spPr/>
+      <a:bodyPr/>
+      <a:lstStyle/>
+      <a:style>
+        <a:lnRef idx="2">
+          <a:schemeClr val="accent1"/>
+        </a:lnRef>
+        <a:fillRef idx="0">
+          <a:schemeClr val="accent1"/>
+        </a:fillRef>
+        <a:effectRef idx="1">
+          <a:schemeClr val="accent1"/>
+        </a:effectRef>
+        <a:fontRef idx="minor">
+          <a:schemeClr val="tx1"/>
+        </a:fontRef>
+      </a:style>
+    </a:lnDef>
+  </a:objectDefaults>
+  <a:extraClrSchemeLst/>
+  <a:extLst>
+    <a:ext uri="{05A4C25C-085E-4340-85A3-A5531E510DB2}">
+      <thm15:themeFamily xmlns:thm15="http://schemas.microsoft.com/office/thememl/2012/main" name="Office Theme" id="{2E142A2C-CD16-42D6-873A-C26D2A0506FA}" vid="{1BDDFF52-6CD6-40A5-AB3C-68EB2F1E4D0A}"/>
+    </a:ext>
+  </a:extLst>
+</a:theme>
 </file>
</xml_diff>